<commit_message>
version 3 de master
</commit_message>
<xml_diff>
--- a/Presentación principal.pptx
+++ b/Presentación principal.pptx
@@ -3602,6 +3602,45 @@
           </a:p>
         </p:txBody>
       </p:sp>
+      <p:sp>
+        <p:nvSpPr>
+          <p:cNvPr id="2" name="CuadroTexto 1">
+            <a:extLst>
+              <a:ext uri="{FF2B5EF4-FFF2-40B4-BE49-F238E27FC236}">
+                <a16:creationId xmlns:a16="http://schemas.microsoft.com/office/drawing/2014/main" id="{07162867-5989-DC18-2D15-77D6E9A4ABFB}"/>
+              </a:ext>
+            </a:extLst>
+          </p:cNvPr>
+          <p:cNvSpPr txBox="1"/>
+          <p:nvPr/>
+        </p:nvSpPr>
+        <p:spPr>
+          <a:xfrm>
+            <a:off x="9312966" y="5918886"/>
+            <a:ext cx="2272137" cy="646331"/>
+          </a:xfrm>
+          <a:prstGeom prst="rect">
+            <a:avLst/>
+          </a:prstGeom>
+          <a:noFill/>
+        </p:spPr>
+        <p:txBody>
+          <a:bodyPr wrap="square" rtlCol="0">
+            <a:spAutoFit/>
+          </a:bodyPr>
+          <a:lstStyle/>
+          <a:p>
+            <a:r>
+              <a:rPr lang="es-CO" dirty="0"/>
+              <a:t>Vamos a ver </a:t>
+            </a:r>
+            <a:r>
+              <a:rPr lang="es-CO"/>
+              <a:t>si combina los archivos</a:t>
+            </a:r>
+          </a:p>
+        </p:txBody>
+      </p:sp>
     </p:spTree>
     <p:extLst>
       <p:ext uri="{BB962C8B-B14F-4D97-AF65-F5344CB8AC3E}">

</xml_diff>